<commit_message>
From Melissa:       Partial part 3 commit       updated part 2
git-svn-id: file://localhost/tmp/svn2git/svn@7536 defb5e50-622e-49ec-a68e-d72c7db87b45
</commit_message>
<xml_diff>
--- a/tutorial/BigJob-XSEDE12/SLIDES/TutorialPart2.pptx
+++ b/tutorial/BigJob-XSEDE12/SLIDES/TutorialPart2.pptx
@@ -265,7 +265,7 @@
             <a:fld id="{8399529C-8CF2-47D0-BE85-DF833C9DE222}" type="datetime1">
               <a:rPr lang="en-US"/>
               <a:pPr/>
-              <a:t>7/14/2012</a:t>
+              <a:t>7/15/2012</a:t>
             </a:fld>
             <a:endParaRPr lang="en-US"/>
           </a:p>
@@ -2117,7 +2117,7 @@
             <a:fld id="{46EC0482-A009-44C8-B0AA-A796A6FB8ABF}" type="datetime1">
               <a:rPr lang="en-US"/>
               <a:pPr/>
-              <a:t>7/14/2012</a:t>
+              <a:t>7/15/2012</a:t>
             </a:fld>
             <a:endParaRPr lang="en-US"/>
           </a:p>
@@ -2245,7 +2245,7 @@
             <a:fld id="{FA22CAD1-A84A-40DA-B096-969086E92675}" type="datetime1">
               <a:rPr lang="en-US"/>
               <a:pPr/>
-              <a:t>7/14/2012</a:t>
+              <a:t>7/15/2012</a:t>
             </a:fld>
             <a:endParaRPr lang="en-US"/>
           </a:p>
@@ -5910,7 +5910,7 @@
             <a:fld id="{96999AEB-98EF-46F6-BBE8-DCF260C9F80F}" type="datetime1">
               <a:rPr lang="en-US"/>
               <a:pPr/>
-              <a:t>7/14/2012</a:t>
+              <a:t>7/15/2012</a:t>
             </a:fld>
             <a:endParaRPr lang="en-US"/>
           </a:p>
@@ -10920,7 +10920,7 @@
             <a:fld id="{B6390B92-557F-46B2-93F4-CCC7D45FA683}" type="datetime1">
               <a:rPr lang="en-US"/>
               <a:pPr/>
-              <a:t>7/14/2012</a:t>
+              <a:t>7/15/2012</a:t>
             </a:fld>
             <a:endParaRPr lang="en-US"/>
           </a:p>
@@ -12435,9 +12435,6 @@
               </a:rPr>
               <a:t>, cont’d</a:t>
             </a:r>
-            <a:endParaRPr lang="en-US" sz="2800" dirty="0" smtClean="0">
-              <a:ea typeface="ＭＳ Ｐゴシック" pitchFamily="34" charset="-128"/>
-            </a:endParaRPr>
           </a:p>
         </p:txBody>
       </p:sp>
@@ -12515,7 +12512,6 @@
               <a:rPr lang="en-US" sz="1600" dirty="0" smtClean="0"/>
               <a:t>What requirements we have for our job</a:t>
             </a:r>
-            <a:endParaRPr lang="en-US" sz="1600" dirty="0" smtClean="0"/>
           </a:p>
         </p:txBody>
       </p:sp>
@@ -13113,9 +13109,6 @@
               </a:rPr>
               <a:t>Hands-On: Putting it All Together</a:t>
             </a:r>
-            <a:endParaRPr lang="en-US" sz="2800" dirty="0" smtClean="0">
-              <a:ea typeface="ＭＳ Ｐゴシック" pitchFamily="34" charset="-128"/>
-            </a:endParaRPr>
           </a:p>
         </p:txBody>
       </p:sp>
@@ -13702,9 +13695,6 @@
               </a:rPr>
               <a:t>Hands-On: Putting it All Together, cont’d </a:t>
             </a:r>
-            <a:endParaRPr lang="en-US" sz="2800" dirty="0" smtClean="0">
-              <a:ea typeface="ＭＳ Ｐゴシック" pitchFamily="34" charset="-128"/>
-            </a:endParaRPr>
           </a:p>
         </p:txBody>
       </p:sp>
@@ -14288,9 +14278,6 @@
               </a:rPr>
               <a:t>So… what did I just do?</a:t>
             </a:r>
-            <a:endParaRPr lang="en-US" sz="2800" dirty="0" smtClean="0">
-              <a:ea typeface="ＭＳ Ｐゴシック" pitchFamily="34" charset="-128"/>
-            </a:endParaRPr>
           </a:p>
         </p:txBody>
       </p:sp>
@@ -14700,10 +14687,6 @@
               </a:rPr>
               <a:t>TACC: Done.</a:t>
             </a:r>
-            <a:endParaRPr lang="en-US" b="1" dirty="0">
-              <a:latin typeface="Courier New" pitchFamily="49" charset="0"/>
-              <a:cs typeface="Courier New" pitchFamily="49" charset="0"/>
-            </a:endParaRPr>
           </a:p>
         </p:txBody>
       </p:sp>
@@ -14899,14 +14882,7 @@
                 <a:latin typeface="Courier New" pitchFamily="49" charset="0"/>
                 <a:cs typeface="Courier New" pitchFamily="49" charset="0"/>
               </a:rPr>
-              <a:t>f</a:t>
-            </a:r>
-            <a:r>
-              <a:rPr lang="en-US" b="1" dirty="0" err="1" smtClean="0">
-                <a:latin typeface="Courier New" pitchFamily="49" charset="0"/>
-                <a:cs typeface="Courier New" pitchFamily="49" charset="0"/>
-              </a:rPr>
-              <a:t>ilesystem.File</a:t>
+              <a:t>filesystem.File</a:t>
             </a:r>
             <a:r>
               <a:rPr lang="en-US" b="1" dirty="0" smtClean="0">
@@ -15146,14 +15122,7 @@
                 <a:latin typeface="Courier New" pitchFamily="49" charset="0"/>
                 <a:cs typeface="Courier New" pitchFamily="49" charset="0"/>
               </a:rPr>
-              <a:t>f</a:t>
-            </a:r>
-            <a:r>
-              <a:rPr lang="en-US" b="1" dirty="0" err="1" smtClean="0">
-                <a:latin typeface="Courier New" pitchFamily="49" charset="0"/>
-                <a:cs typeface="Courier New" pitchFamily="49" charset="0"/>
-              </a:rPr>
-              <a:t>ilesystem.Directory</a:t>
+              <a:t>filesystem.Directory</a:t>
             </a:r>
             <a:r>
               <a:rPr lang="en-US" b="1" dirty="0" smtClean="0">
@@ -15420,9 +15389,6 @@
               </a:rPr>
               <a:t>Hands-On: Listing a Remote Directory</a:t>
             </a:r>
-            <a:endParaRPr lang="en-US" sz="2800" dirty="0" smtClean="0">
-              <a:ea typeface="ＭＳ Ｐゴシック" pitchFamily="34" charset="-128"/>
-            </a:endParaRPr>
           </a:p>
         </p:txBody>
       </p:sp>
@@ -15547,14 +15513,7 @@
                 <a:latin typeface="Courier New" pitchFamily="49" charset="0"/>
                 <a:cs typeface="Courier New" pitchFamily="49" charset="0"/>
               </a:rPr>
-              <a:t>f</a:t>
-            </a:r>
-            <a:r>
-              <a:rPr lang="en-US" b="1" dirty="0" err="1" smtClean="0">
-                <a:latin typeface="Courier New" pitchFamily="49" charset="0"/>
-                <a:cs typeface="Courier New" pitchFamily="49" charset="0"/>
-              </a:rPr>
-              <a:t>ilesystem.File</a:t>
+              <a:t>filesystem.File</a:t>
             </a:r>
             <a:r>
               <a:rPr lang="en-US" b="1" dirty="0" smtClean="0">
@@ -15794,14 +15753,7 @@
                 <a:latin typeface="Courier New" pitchFamily="49" charset="0"/>
                 <a:cs typeface="Courier New" pitchFamily="49" charset="0"/>
               </a:rPr>
-              <a:t>f</a:t>
-            </a:r>
-            <a:r>
-              <a:rPr lang="en-US" b="1" dirty="0" err="1" smtClean="0">
-                <a:latin typeface="Courier New" pitchFamily="49" charset="0"/>
-                <a:cs typeface="Courier New" pitchFamily="49" charset="0"/>
-              </a:rPr>
-              <a:t>ilesystem.Directory</a:t>
+              <a:t>filesystem.Directory</a:t>
             </a:r>
             <a:r>
               <a:rPr lang="en-US" b="1" dirty="0" smtClean="0">
@@ -16068,9 +16020,6 @@
               </a:rPr>
               <a:t>Hands-On: Listing a Remote Directory</a:t>
             </a:r>
-            <a:endParaRPr lang="en-US" sz="2800" dirty="0" smtClean="0">
-              <a:ea typeface="ＭＳ Ｐゴシック" pitchFamily="34" charset="-128"/>
-            </a:endParaRPr>
           </a:p>
         </p:txBody>
       </p:sp>
@@ -16678,9 +16627,6 @@
               </a:rPr>
               <a:t>Hands-On: Listing a Remote Directory, cont’d </a:t>
             </a:r>
-            <a:endParaRPr lang="en-US" sz="2800" dirty="0" smtClean="0">
-              <a:ea typeface="ＭＳ Ｐゴシック" pitchFamily="34" charset="-128"/>
-            </a:endParaRPr>
           </a:p>
         </p:txBody>
       </p:sp>
@@ -17081,9 +17027,6 @@
               </a:rPr>
               <a:t>Mandelbrot Fractals</a:t>
             </a:r>
-            <a:endParaRPr lang="en-US" sz="2800" dirty="0" smtClean="0">
-              <a:ea typeface="ＭＳ Ｐゴシック" pitchFamily="34" charset="-128"/>
-            </a:endParaRPr>
           </a:p>
         </p:txBody>
       </p:sp>
@@ -17231,9 +17174,6 @@
               </a:rPr>
               <a:t>Hands-On: Distributed Mandelbrot</a:t>
             </a:r>
-            <a:endParaRPr lang="en-US" sz="2800" dirty="0" smtClean="0">
-              <a:ea typeface="ＭＳ Ｐゴシック" pitchFamily="34" charset="-128"/>
-            </a:endParaRPr>
           </a:p>
         </p:txBody>
       </p:sp>
@@ -17735,7 +17675,6 @@
               <a:rPr lang="en-US" dirty="0" smtClean="0"/>
               <a:t> script via command line (1024 x 1024 fractal).</a:t>
             </a:r>
-            <a:endParaRPr lang="en-US" dirty="0" smtClean="0"/>
           </a:p>
         </p:txBody>
       </p:sp>
@@ -18533,9 +18472,6 @@
               </a:rPr>
               <a:t>Hands-On: Distributed Mandelbrot, cont’d</a:t>
             </a:r>
-            <a:endParaRPr lang="en-US" sz="2800" dirty="0" smtClean="0">
-              <a:ea typeface="ＭＳ Ｐゴシック" pitchFamily="34" charset="-128"/>
-            </a:endParaRPr>
           </a:p>
         </p:txBody>
       </p:sp>
@@ -19115,9 +19051,6 @@
               </a:rPr>
               <a:t>Hands-On: Distributed Mandelbrot, cont’d</a:t>
             </a:r>
-            <a:endParaRPr lang="en-US" sz="2800" dirty="0" smtClean="0">
-              <a:ea typeface="ＭＳ Ｐゴシック" pitchFamily="34" charset="-128"/>
-            </a:endParaRPr>
           </a:p>
         </p:txBody>
       </p:sp>
@@ -19816,9 +19749,6 @@
               </a:rPr>
               <a:t>Hands-On: Distributed Mandelbrot, cont’d</a:t>
             </a:r>
-            <a:endParaRPr lang="en-US" sz="2800" dirty="0" smtClean="0">
-              <a:ea typeface="ＭＳ Ｐゴシック" pitchFamily="34" charset="-128"/>
-            </a:endParaRPr>
           </a:p>
         </p:txBody>
       </p:sp>
@@ -20142,7 +20072,6 @@
               <a:rPr lang="en-US" dirty="0" smtClean="0"/>
               <a:t>Image can be viewed using any image viewer installed on your machine.</a:t>
             </a:r>
-            <a:endParaRPr lang="en-US" dirty="0" smtClean="0"/>
           </a:p>
         </p:txBody>
       </p:sp>
@@ -20205,9 +20134,6 @@
               </a:rPr>
               <a:t>Conclusion</a:t>
             </a:r>
-            <a:endParaRPr lang="en-US" sz="2800" dirty="0" smtClean="0">
-              <a:ea typeface="ＭＳ Ｐゴシック" pitchFamily="34" charset="-128"/>
-            </a:endParaRPr>
           </a:p>
         </p:txBody>
       </p:sp>
@@ -20574,9 +20500,6 @@
               </a:rPr>
               <a:t>Questions?</a:t>
             </a:r>
-            <a:endParaRPr lang="en-US" sz="2800" dirty="0" smtClean="0">
-              <a:ea typeface="ＭＳ Ｐゴシック" pitchFamily="34" charset="-128"/>
-            </a:endParaRPr>
           </a:p>
         </p:txBody>
       </p:sp>
@@ -20776,25 +20699,7 @@
                 </a:solidFill>
                 <a:ea typeface="ＭＳ Ｐゴシック" pitchFamily="34" charset="-128"/>
               </a:rPr>
-              <a:t>Provides </a:t>
-            </a:r>
-            <a:r>
-              <a:rPr lang="en-US" dirty="0" err="1" smtClean="0">
-                <a:solidFill>
-                  <a:srgbClr val="595959"/>
-                </a:solidFill>
-                <a:ea typeface="ＭＳ Ｐゴシック" pitchFamily="34" charset="-128"/>
-              </a:rPr>
-              <a:t>plugins</a:t>
-            </a:r>
-            <a:r>
-              <a:rPr lang="en-US" dirty="0" smtClean="0">
-                <a:solidFill>
-                  <a:srgbClr val="595959"/>
-                </a:solidFill>
-                <a:ea typeface="ＭＳ Ｐゴシック" pitchFamily="34" charset="-128"/>
-              </a:rPr>
-              <a:t> for different distributed middleware systems and services</a:t>
+              <a:t>Provides plug-ins for different distributed middleware systems and services</a:t>
             </a:r>
           </a:p>
           <a:p>
@@ -20881,15 +20786,7 @@
             </a:pPr>
             <a:r>
               <a:rPr lang="en-US" dirty="0" smtClean="0"/>
-              <a:t>SGE(+SSH) - Provides local and remote access to Sun (</a:t>
-            </a:r>
-            <a:r>
-              <a:rPr lang="en-US" dirty="0" err="1" smtClean="0"/>
-              <a:t>Orcale</a:t>
-            </a:r>
-            <a:r>
-              <a:rPr lang="en-US" dirty="0" smtClean="0"/>
-              <a:t>) Grid Engine clusters.</a:t>
+              <a:t>SGE(+SSH) - Provides local and remote access to Sun (Oracle) Grid Engine clusters.</a:t>
             </a:r>
           </a:p>
           <a:p>
@@ -21109,7 +21006,7 @@
         </p:nvSpPr>
         <p:spPr>
           <a:xfrm>
-            <a:off x="609600" y="3388658"/>
+            <a:off x="609600" y="3056149"/>
             <a:ext cx="7942729" cy="1613647"/>
           </a:xfrm>
           <a:prstGeom prst="rect">
@@ -21189,6 +21086,151 @@
               </a:effectLst>
               <a:latin typeface="Courier New" pitchFamily="49" charset="0"/>
               <a:cs typeface="Courier New" pitchFamily="49" charset="0"/>
+            </a:endParaRPr>
+          </a:p>
+        </p:txBody>
+      </p:sp>
+      <p:sp>
+        <p:nvSpPr>
+          <p:cNvPr id="6" name="Content Placeholder 4"/>
+          <p:cNvSpPr txBox="1">
+            <a:spLocks/>
+          </p:cNvSpPr>
+          <p:nvPr/>
+        </p:nvSpPr>
+        <p:spPr bwMode="auto">
+          <a:xfrm>
+            <a:off x="466164" y="5253316"/>
+            <a:ext cx="8229600" cy="1577789"/>
+          </a:xfrm>
+          <a:prstGeom prst="rect">
+            <a:avLst/>
+          </a:prstGeom>
+          <a:noFill/>
+          <a:ln w="9525">
+            <a:noFill/>
+            <a:miter lim="800000"/>
+            <a:headEnd/>
+            <a:tailEnd/>
+          </a:ln>
+        </p:spPr>
+        <p:txBody>
+          <a:bodyPr vert="horz" wrap="square" lIns="91440" tIns="45720" rIns="91440" bIns="45720" numCol="1" anchor="t" anchorCtr="0" compatLnSpc="1">
+            <a:prstTxWarp prst="textNoShape">
+              <a:avLst/>
+            </a:prstTxWarp>
+          </a:bodyPr>
+          <a:lstStyle/>
+          <a:p>
+            <a:pPr marL="342900" marR="0" lvl="0" indent="-342900" algn="l" defTabSz="914400" rtl="0" eaLnBrk="0" fontAlgn="base" latinLnBrk="0" hangingPunct="0">
+              <a:lnSpc>
+                <a:spcPct val="100000"/>
+              </a:lnSpc>
+              <a:spcBef>
+                <a:spcPct val="20000"/>
+              </a:spcBef>
+              <a:spcAft>
+                <a:spcPct val="0"/>
+              </a:spcAft>
+              <a:buClrTx/>
+              <a:buSzTx/>
+              <a:buFontTx/>
+              <a:buChar char="•"/>
+              <a:tabLst/>
+              <a:defRPr/>
+            </a:pPr>
+            <a:r>
+              <a:rPr kumimoji="0" lang="en-US" sz="2200" b="0" i="0" u="none" strike="noStrike" kern="0" cap="none" spc="0" normalizeH="0" baseline="0" noProof="0" dirty="0" smtClean="0">
+                <a:ln>
+                  <a:noFill/>
+                </a:ln>
+                <a:solidFill>
+                  <a:srgbClr val="5F5F5F"/>
+                </a:solidFill>
+                <a:effectLst/>
+                <a:uLnTx/>
+                <a:uFillTx/>
+                <a:latin typeface="+mn-lt"/>
+                <a:ea typeface="ＭＳ Ｐゴシック" charset="-128"/>
+                <a:cs typeface="ＭＳ Ｐゴシック" charset="-128"/>
+              </a:rPr>
+              <a:t>Quick note: This </a:t>
+            </a:r>
+            <a:r>
+              <a:rPr kumimoji="0" lang="en-US" sz="2200" b="0" i="0" u="none" strike="noStrike" kern="0" cap="none" spc="0" normalizeH="0" baseline="0" noProof="0" dirty="0" smtClean="0">
+                <a:ln>
+                  <a:noFill/>
+                </a:ln>
+                <a:solidFill>
+                  <a:srgbClr val="5F5F5F"/>
+                </a:solidFill>
+                <a:effectLst/>
+                <a:uLnTx/>
+                <a:uFillTx/>
+                <a:latin typeface="+mn-lt"/>
+                <a:ea typeface="ＭＳ Ｐゴシック" charset="-128"/>
+                <a:cs typeface="ＭＳ Ｐゴシック" charset="-128"/>
+              </a:rPr>
+              <a:t>tutorial</a:t>
+            </a:r>
+            <a:r>
+              <a:rPr kumimoji="0" lang="en-US" sz="2200" b="0" i="0" u="none" strike="noStrike" kern="0" cap="none" spc="0" normalizeH="0" noProof="0" dirty="0" smtClean="0">
+                <a:ln>
+                  <a:noFill/>
+                </a:ln>
+                <a:solidFill>
+                  <a:srgbClr val="5F5F5F"/>
+                </a:solidFill>
+                <a:effectLst/>
+                <a:uLnTx/>
+                <a:uFillTx/>
+                <a:latin typeface="+mn-lt"/>
+                <a:ea typeface="ＭＳ Ｐゴシック" charset="-128"/>
+                <a:cs typeface="ＭＳ Ｐゴシック" charset="-128"/>
+              </a:rPr>
+              <a:t> utilizes the XSEDE resource </a:t>
+            </a:r>
+            <a:r>
+              <a:rPr kumimoji="0" lang="en-US" sz="2200" b="0" i="0" u="none" strike="noStrike" kern="0" cap="none" spc="0" normalizeH="0" noProof="0" dirty="0" err="1" smtClean="0">
+                <a:ln>
+                  <a:noFill/>
+                </a:ln>
+                <a:solidFill>
+                  <a:srgbClr val="5F5F5F"/>
+                </a:solidFill>
+                <a:effectLst/>
+                <a:uLnTx/>
+                <a:uFillTx/>
+                <a:latin typeface="+mn-lt"/>
+                <a:ea typeface="ＭＳ Ｐゴシック" charset="-128"/>
+                <a:cs typeface="ＭＳ Ｐゴシック" charset="-128"/>
+              </a:rPr>
+              <a:t>Lonestar</a:t>
+            </a:r>
+            <a:r>
+              <a:rPr lang="en-US" sz="2200" kern="0" dirty="0" smtClean="0">
+                <a:solidFill>
+                  <a:srgbClr val="5F5F5F"/>
+                </a:solidFill>
+                <a:latin typeface="+mn-lt"/>
+                <a:ea typeface="ＭＳ Ｐゴシック" charset="-128"/>
+                <a:cs typeface="ＭＳ Ｐゴシック" charset="-128"/>
+              </a:rPr>
+              <a:t>. The environment set-up details are specific to this resource.</a:t>
+            </a:r>
+            <a:endParaRPr kumimoji="0" lang="en-US" sz="2200" b="0" i="0" u="none" strike="noStrike" kern="0" cap="none" spc="0" normalizeH="0" baseline="0" noProof="0" dirty="0">
+              <a:ln>
+                <a:noFill/>
+              </a:ln>
+              <a:solidFill>
+                <a:srgbClr val="5F5F5F"/>
+              </a:solidFill>
+              <a:effectLst/>
+              <a:uLnTx/>
+              <a:uFillTx/>
+              <a:latin typeface="+mn-lt"/>
+              <a:ea typeface="ＭＳ Ｐゴシック" charset="-128"/>
+              <a:cs typeface="ＭＳ Ｐゴシック" charset="-128"/>
             </a:endParaRPr>
           </a:p>
         </p:txBody>

</xml_diff>